<commit_message>
fin pptx realy end
</commit_message>
<xml_diff>
--- a/bazard/Présentation ODIARD PASINI.pptx
+++ b/bazard/Présentation ODIARD PASINI.pptx
@@ -122,7 +122,7 @@
   </p:defaultTextStyle>
   <p:extLst>
     <p:ext uri="{EFAFB233-063F-42B5-8137-9DF3F51BA10A}">
-      <p15:sldGuideLst xmlns:p15="http://schemas.microsoft.com/office/powerpoint/2012/main" xmlns="">
+      <p15:sldGuideLst xmlns="" xmlns:p15="http://schemas.microsoft.com/office/powerpoint/2012/main">
         <p15:guide id="1" orient="horz" pos="2160">
           <p15:clr>
             <a:srgbClr val="A4A3A4"/>
@@ -136,7 +136,7 @@
       </p15:sldGuideLst>
     </p:ext>
     <p:ext uri="{2D200454-40CA-4A62-9FC3-DE9A4176ACB9}">
-      <p15:notesGuideLst xmlns:p15="http://schemas.microsoft.com/office/powerpoint/2012/main" xmlns=""/>
+      <p15:notesGuideLst xmlns="" xmlns:p15="http://schemas.microsoft.com/office/powerpoint/2012/main"/>
     </p:ext>
   </p:extLst>
 </p:presentation>
@@ -857,7 +857,7 @@
     <a:masterClrMapping/>
   </p:clrMapOvr>
   <mc:AlternateContent xmlns:mc="http://schemas.openxmlformats.org/markup-compatibility/2006">
-    <mc:Choice xmlns:p15="http://schemas.microsoft.com/office/powerpoint/2012/main" xmlns="" Requires="p15">
+    <mc:Choice xmlns="" xmlns:p15="http://schemas.microsoft.com/office/powerpoint/2012/main" Requires="p15">
       <p:transition xmlns:p14="http://schemas.microsoft.com/office/powerpoint/2010/main" spd="slow" p14:dur="2000">
         <p15:prstTrans prst="fracture"/>
       </p:transition>
@@ -1039,7 +1039,7 @@
     <a:masterClrMapping/>
   </p:clrMapOvr>
   <mc:AlternateContent xmlns:mc="http://schemas.openxmlformats.org/markup-compatibility/2006">
-    <mc:Choice xmlns:p15="http://schemas.microsoft.com/office/powerpoint/2012/main" xmlns="" Requires="p15">
+    <mc:Choice xmlns="" xmlns:p15="http://schemas.microsoft.com/office/powerpoint/2012/main" Requires="p15">
       <p:transition xmlns:p14="http://schemas.microsoft.com/office/powerpoint/2010/main" spd="slow" p14:dur="2000">
         <p15:prstTrans prst="fracture"/>
       </p:transition>
@@ -1231,7 +1231,7 @@
     <a:masterClrMapping/>
   </p:clrMapOvr>
   <mc:AlternateContent xmlns:mc="http://schemas.openxmlformats.org/markup-compatibility/2006">
-    <mc:Choice xmlns:p15="http://schemas.microsoft.com/office/powerpoint/2012/main" xmlns="" Requires="p15">
+    <mc:Choice xmlns="" xmlns:p15="http://schemas.microsoft.com/office/powerpoint/2012/main" Requires="p15">
       <p:transition xmlns:p14="http://schemas.microsoft.com/office/powerpoint/2010/main" spd="slow" p14:dur="2000">
         <p15:prstTrans prst="fracture"/>
       </p:transition>
@@ -1413,7 +1413,7 @@
     <a:masterClrMapping/>
   </p:clrMapOvr>
   <mc:AlternateContent xmlns:mc="http://schemas.openxmlformats.org/markup-compatibility/2006">
-    <mc:Choice xmlns:p15="http://schemas.microsoft.com/office/powerpoint/2012/main" xmlns="" Requires="p15">
+    <mc:Choice xmlns="" xmlns:p15="http://schemas.microsoft.com/office/powerpoint/2012/main" Requires="p15">
       <p:transition xmlns:p14="http://schemas.microsoft.com/office/powerpoint/2010/main" spd="slow" p14:dur="2000">
         <p15:prstTrans prst="fracture"/>
       </p:transition>
@@ -1676,7 +1676,7 @@
     <a:masterClrMapping/>
   </p:clrMapOvr>
   <mc:AlternateContent xmlns:mc="http://schemas.openxmlformats.org/markup-compatibility/2006">
-    <mc:Choice xmlns:p15="http://schemas.microsoft.com/office/powerpoint/2012/main" xmlns="" Requires="p15">
+    <mc:Choice xmlns="" xmlns:p15="http://schemas.microsoft.com/office/powerpoint/2012/main" Requires="p15">
       <p:transition xmlns:p14="http://schemas.microsoft.com/office/powerpoint/2010/main" spd="slow" p14:dur="2000">
         <p15:prstTrans prst="fracture"/>
       </p:transition>
@@ -1976,7 +1976,7 @@
     <a:masterClrMapping/>
   </p:clrMapOvr>
   <mc:AlternateContent xmlns:mc="http://schemas.openxmlformats.org/markup-compatibility/2006">
-    <mc:Choice xmlns:p15="http://schemas.microsoft.com/office/powerpoint/2012/main" xmlns="" Requires="p15">
+    <mc:Choice xmlns="" xmlns:p15="http://schemas.microsoft.com/office/powerpoint/2012/main" Requires="p15">
       <p:transition xmlns:p14="http://schemas.microsoft.com/office/powerpoint/2010/main" spd="slow" p14:dur="2000">
         <p15:prstTrans prst="fracture"/>
       </p:transition>
@@ -2408,7 +2408,7 @@
     <a:masterClrMapping/>
   </p:clrMapOvr>
   <mc:AlternateContent xmlns:mc="http://schemas.openxmlformats.org/markup-compatibility/2006">
-    <mc:Choice xmlns:p15="http://schemas.microsoft.com/office/powerpoint/2012/main" xmlns="" Requires="p15">
+    <mc:Choice xmlns="" xmlns:p15="http://schemas.microsoft.com/office/powerpoint/2012/main" Requires="p15">
       <p:transition xmlns:p14="http://schemas.microsoft.com/office/powerpoint/2010/main" spd="slow" p14:dur="2000">
         <p15:prstTrans prst="fracture"/>
       </p:transition>
@@ -2538,7 +2538,7 @@
     <a:masterClrMapping/>
   </p:clrMapOvr>
   <mc:AlternateContent xmlns:mc="http://schemas.openxmlformats.org/markup-compatibility/2006">
-    <mc:Choice xmlns:p15="http://schemas.microsoft.com/office/powerpoint/2012/main" xmlns="" Requires="p15">
+    <mc:Choice xmlns="" xmlns:p15="http://schemas.microsoft.com/office/powerpoint/2012/main" Requires="p15">
       <p:transition xmlns:p14="http://schemas.microsoft.com/office/powerpoint/2010/main" spd="slow" p14:dur="2000">
         <p15:prstTrans prst="fracture"/>
       </p:transition>
@@ -2652,7 +2652,7 @@
     <a:masterClrMapping/>
   </p:clrMapOvr>
   <mc:AlternateContent xmlns:mc="http://schemas.openxmlformats.org/markup-compatibility/2006">
-    <mc:Choice xmlns:p15="http://schemas.microsoft.com/office/powerpoint/2012/main" xmlns="" Requires="p15">
+    <mc:Choice xmlns="" xmlns:p15="http://schemas.microsoft.com/office/powerpoint/2012/main" Requires="p15">
       <p:transition xmlns:p14="http://schemas.microsoft.com/office/powerpoint/2010/main" spd="slow" p14:dur="2000">
         <p15:prstTrans prst="fracture"/>
       </p:transition>
@@ -2948,7 +2948,7 @@
     <a:masterClrMapping/>
   </p:clrMapOvr>
   <mc:AlternateContent xmlns:mc="http://schemas.openxmlformats.org/markup-compatibility/2006">
-    <mc:Choice xmlns:p15="http://schemas.microsoft.com/office/powerpoint/2012/main" xmlns="" Requires="p15">
+    <mc:Choice xmlns="" xmlns:p15="http://schemas.microsoft.com/office/powerpoint/2012/main" Requires="p15">
       <p:transition xmlns:p14="http://schemas.microsoft.com/office/powerpoint/2010/main" spd="slow" p14:dur="2000">
         <p15:prstTrans prst="fracture"/>
       </p:transition>
@@ -3224,7 +3224,7 @@
     <a:masterClrMapping/>
   </p:clrMapOvr>
   <mc:AlternateContent xmlns:mc="http://schemas.openxmlformats.org/markup-compatibility/2006">
-    <mc:Choice xmlns:p15="http://schemas.microsoft.com/office/powerpoint/2012/main" xmlns="" Requires="p15">
+    <mc:Choice xmlns="" xmlns:p15="http://schemas.microsoft.com/office/powerpoint/2012/main" Requires="p15">
       <p:transition xmlns:p14="http://schemas.microsoft.com/office/powerpoint/2010/main" spd="slow" p14:dur="2000">
         <p15:prstTrans prst="fracture"/>
       </p:transition>
@@ -3498,7 +3498,7 @@
     <p:sldLayoutId id="2147483851" r:id="rId11"/>
   </p:sldLayoutIdLst>
   <mc:AlternateContent xmlns:mc="http://schemas.openxmlformats.org/markup-compatibility/2006">
-    <mc:Choice xmlns:p15="http://schemas.microsoft.com/office/powerpoint/2012/main" xmlns="" Requires="p15">
+    <mc:Choice xmlns="" xmlns:p15="http://schemas.microsoft.com/office/powerpoint/2012/main" Requires="p15">
       <p:transition xmlns:p14="http://schemas.microsoft.com/office/powerpoint/2010/main" spd="slow" p14:dur="2000">
         <p15:prstTrans prst="fracture"/>
       </p:transition>
@@ -3792,7 +3792,7 @@
   </p:txStyles>
   <p:extLst mod="1">
     <p:ext uri="{27BBF7A9-308A-43DC-89C8-2F10F3537804}">
-      <p15:sldGuideLst xmlns:p15="http://schemas.microsoft.com/office/powerpoint/2012/main" xmlns="">
+      <p15:sldGuideLst xmlns="" xmlns:p15="http://schemas.microsoft.com/office/powerpoint/2012/main">
         <p15:guide id="1" orient="horz" pos="2160" userDrawn="1">
           <p15:clr>
             <a:srgbClr val="F26B43"/>
@@ -4156,7 +4156,7 @@
     <a:masterClrMapping/>
   </p:clrMapOvr>
   <mc:AlternateContent xmlns:mc="http://schemas.openxmlformats.org/markup-compatibility/2006">
-    <mc:Choice xmlns:p15="http://schemas.microsoft.com/office/powerpoint/2012/main" xmlns="" Requires="p15">
+    <mc:Choice xmlns="" xmlns:p15="http://schemas.microsoft.com/office/powerpoint/2012/main" Requires="p15">
       <p:transition xmlns:p14="http://schemas.microsoft.com/office/powerpoint/2010/main" spd="slow" p14:dur="2000">
         <p15:prstTrans prst="fracture"/>
       </p:transition>
@@ -4273,41 +4273,20 @@
               <a:rPr lang="fr-FR" sz="3500" dirty="0" smtClean="0">
                 <a:latin typeface="Helvetica LT Std" panose="020B0504020202020204" pitchFamily="34" charset="0"/>
               </a:rPr>
-              <a:t> </a:t>
-            </a:r>
+              <a:t> de DAO</a:t>
+            </a:r>
+          </a:p>
+          <a:p>
+            <a:endParaRPr lang="fr-FR" sz="3500" dirty="0" smtClean="0">
+              <a:latin typeface="Helvetica LT Std" panose="020B0504020202020204" pitchFamily="34" charset="0"/>
+            </a:endParaRPr>
+          </a:p>
+          <a:p>
             <a:r>
               <a:rPr lang="fr-FR" sz="3500" dirty="0" smtClean="0">
                 <a:latin typeface="Helvetica LT Std" panose="020B0504020202020204" pitchFamily="34" charset="0"/>
               </a:rPr>
-              <a:t>de </a:t>
-            </a:r>
-            <a:r>
-              <a:rPr lang="fr-FR" sz="3500" dirty="0" smtClean="0">
-                <a:latin typeface="Helvetica LT Std" panose="020B0504020202020204" pitchFamily="34" charset="0"/>
-              </a:rPr>
-              <a:t>DAO</a:t>
-            </a:r>
-            <a:endParaRPr lang="fr-FR" sz="3500" dirty="0" smtClean="0">
-              <a:latin typeface="Helvetica LT Std" panose="020B0504020202020204" pitchFamily="34" charset="0"/>
-            </a:endParaRPr>
-          </a:p>
-          <a:p>
-            <a:endParaRPr lang="fr-FR" sz="3500" dirty="0" smtClean="0">
-              <a:latin typeface="Helvetica LT Std" panose="020B0504020202020204" pitchFamily="34" charset="0"/>
-            </a:endParaRPr>
-          </a:p>
-          <a:p>
-            <a:r>
-              <a:rPr lang="fr-FR" sz="3500" dirty="0" smtClean="0">
-                <a:latin typeface="Helvetica LT Std" panose="020B0504020202020204" pitchFamily="34" charset="0"/>
-              </a:rPr>
-              <a:t>Réorganisation </a:t>
-            </a:r>
-            <a:r>
-              <a:rPr lang="fr-FR" sz="3500" dirty="0" smtClean="0">
-                <a:latin typeface="Helvetica LT Std" panose="020B0504020202020204" pitchFamily="34" charset="0"/>
-              </a:rPr>
-              <a:t>des </a:t>
+              <a:t>Réorganisation des </a:t>
             </a:r>
             <a:r>
               <a:rPr lang="fr-FR" sz="3500" dirty="0" err="1" smtClean="0">
@@ -4375,7 +4354,7 @@
     <a:masterClrMapping/>
   </p:clrMapOvr>
   <mc:AlternateContent xmlns:mc="http://schemas.openxmlformats.org/markup-compatibility/2006">
-    <mc:Choice xmlns:p15="http://schemas.microsoft.com/office/powerpoint/2012/main" xmlns="" Requires="p15">
+    <mc:Choice xmlns="" xmlns:p15="http://schemas.microsoft.com/office/powerpoint/2012/main" Requires="p15">
       <p:transition xmlns:p14="http://schemas.microsoft.com/office/powerpoint/2010/main" spd="slow" p14:dur="2000">
         <p15:prstTrans prst="fracture"/>
       </p:transition>
@@ -4474,13 +4453,7 @@
               <a:rPr lang="fr-FR" sz="3500" dirty="0" smtClean="0">
                 <a:latin typeface="Helvetica LT Std" panose="020B0504020202020204" pitchFamily="34" charset="0"/>
               </a:rPr>
-              <a:t>Bonne compartimentation du </a:t>
-            </a:r>
-            <a:r>
-              <a:rPr lang="fr-FR" sz="3500" dirty="0" smtClean="0">
-                <a:latin typeface="Helvetica LT Std" panose="020B0504020202020204" pitchFamily="34" charset="0"/>
-              </a:rPr>
-              <a:t>code selon le pattern MVC</a:t>
+              <a:t>Bonne compartimentation du code selon le pattern MVC</a:t>
             </a:r>
           </a:p>
           <a:p>
@@ -4505,29 +4478,8 @@
               <a:rPr lang="fr-FR" sz="3500" dirty="0" smtClean="0">
                 <a:latin typeface="Helvetica LT Std" panose="020B0504020202020204" pitchFamily="34" charset="0"/>
               </a:rPr>
-              <a:t> » </a:t>
-            </a:r>
-            <a:r>
-              <a:rPr lang="fr-FR" sz="3500" dirty="0" smtClean="0">
-                <a:latin typeface="Helvetica LT Std" panose="020B0504020202020204" pitchFamily="34" charset="0"/>
-              </a:rPr>
-              <a:t>très génériques, </a:t>
-            </a:r>
-            <a:r>
-              <a:rPr lang="fr-FR" sz="3500" dirty="0" smtClean="0">
-                <a:latin typeface="Helvetica LT Std" panose="020B0504020202020204" pitchFamily="34" charset="0"/>
-              </a:rPr>
-              <a:t>permet la </a:t>
-            </a:r>
-            <a:r>
-              <a:rPr lang="fr-FR" sz="3500" dirty="0" smtClean="0">
-                <a:latin typeface="Helvetica LT Std" panose="020B0504020202020204" pitchFamily="34" charset="0"/>
-              </a:rPr>
-              <a:t>réutilisation dans d’autres projets</a:t>
-            </a:r>
-            <a:endParaRPr lang="fr-FR" sz="3500" dirty="0" smtClean="0">
-              <a:latin typeface="Helvetica LT Std" panose="020B0504020202020204" pitchFamily="34" charset="0"/>
-            </a:endParaRPr>
+              <a:t> » très génériques, permet la réutilisation dans d’autres projets</a:t>
+            </a:r>
           </a:p>
           <a:p>
             <a:endParaRPr lang="fr-FR" sz="3500" dirty="0" smtClean="0">
@@ -4595,7 +4547,7 @@
     <a:masterClrMapping/>
   </p:clrMapOvr>
   <mc:AlternateContent xmlns:mc="http://schemas.openxmlformats.org/markup-compatibility/2006">
-    <mc:Choice xmlns:p15="http://schemas.microsoft.com/office/powerpoint/2012/main" xmlns="" Requires="p15">
+    <mc:Choice xmlns="" xmlns:p15="http://schemas.microsoft.com/office/powerpoint/2012/main" Requires="p15">
       <p:transition xmlns:p14="http://schemas.microsoft.com/office/powerpoint/2010/main" spd="slow" p14:dur="2000">
         <p15:prstTrans prst="fracture"/>
       </p:transition>
@@ -4855,7 +4807,7 @@
     <a:masterClrMapping/>
   </p:clrMapOvr>
   <mc:AlternateContent xmlns:mc="http://schemas.openxmlformats.org/markup-compatibility/2006">
-    <mc:Choice xmlns:p15="http://schemas.microsoft.com/office/powerpoint/2012/main" xmlns="" Requires="p15">
+    <mc:Choice xmlns="" xmlns:p15="http://schemas.microsoft.com/office/powerpoint/2012/main" Requires="p15">
       <p:transition xmlns:p14="http://schemas.microsoft.com/office/powerpoint/2010/main" spd="slow" p14:dur="2000">
         <p15:prstTrans prst="fracture"/>
       </p:transition>
@@ -5058,7 +5010,7 @@
     <a:masterClrMapping/>
   </p:clrMapOvr>
   <mc:AlternateContent xmlns:mc="http://schemas.openxmlformats.org/markup-compatibility/2006">
-    <mc:Choice xmlns:p15="http://schemas.microsoft.com/office/powerpoint/2012/main" xmlns="" Requires="p15">
+    <mc:Choice xmlns="" xmlns:p15="http://schemas.microsoft.com/office/powerpoint/2012/main" Requires="p15">
       <p:transition xmlns:p14="http://schemas.microsoft.com/office/powerpoint/2010/main" spd="slow" p14:dur="2000">
         <p15:prstTrans prst="fracture"/>
       </p:transition>
@@ -5173,17 +5125,14 @@
               <a:t>Charge la </a:t>
             </a:r>
             <a:r>
-              <a:rPr lang="fr-FR" sz="3500" dirty="0" err="1" smtClean="0">
-                <a:latin typeface="Helvetica LT Std" panose="020B0504020202020204" pitchFamily="34" charset="0"/>
-              </a:rPr>
-              <a:t>view</a:t>
-            </a:r>
-            <a:r>
               <a:rPr lang="fr-FR" sz="3500" dirty="0" smtClean="0">
                 <a:latin typeface="Helvetica LT Std" panose="020B0504020202020204" pitchFamily="34" charset="0"/>
               </a:rPr>
-              <a:t> souhaité</a:t>
-            </a:r>
+              <a:t>vue souhaitée</a:t>
+            </a:r>
+            <a:endParaRPr lang="fr-FR" sz="3500" dirty="0" smtClean="0">
+              <a:latin typeface="Helvetica LT Std" panose="020B0504020202020204" pitchFamily="34" charset="0"/>
+            </a:endParaRPr>
           </a:p>
           <a:p>
             <a:endParaRPr lang="fr-FR" sz="3500" dirty="0">
@@ -5252,7 +5201,7 @@
     <a:masterClrMapping/>
   </p:clrMapOvr>
   <mc:AlternateContent xmlns:mc="http://schemas.openxmlformats.org/markup-compatibility/2006">
-    <mc:Choice xmlns:p15="http://schemas.microsoft.com/office/powerpoint/2012/main" xmlns="" Requires="p15">
+    <mc:Choice xmlns="" xmlns:p15="http://schemas.microsoft.com/office/powerpoint/2012/main" Requires="p15">
       <p:transition xmlns:p14="http://schemas.microsoft.com/office/powerpoint/2010/main" spd="slow" p14:dur="2000">
         <p15:prstTrans prst="fracture"/>
       </p:transition>
@@ -5351,13 +5300,13 @@
               <a:rPr lang="fr-FR" sz="3500" dirty="0" smtClean="0">
                 <a:latin typeface="Helvetica LT Std" panose="020B0504020202020204" pitchFamily="34" charset="0"/>
               </a:rPr>
-              <a:t>Chargé de l’affichage de </a:t>
+              <a:t>Chargée </a:t>
             </a:r>
             <a:r>
               <a:rPr lang="fr-FR" sz="3500" dirty="0" smtClean="0">
                 <a:latin typeface="Helvetica LT Std" panose="020B0504020202020204" pitchFamily="34" charset="0"/>
               </a:rPr>
-              <a:t>l’information</a:t>
+              <a:t>de l’affichage de l’information</a:t>
             </a:r>
           </a:p>
           <a:p>
@@ -5430,7 +5379,7 @@
     <a:masterClrMapping/>
   </p:clrMapOvr>
   <mc:AlternateContent xmlns:mc="http://schemas.openxmlformats.org/markup-compatibility/2006">
-    <mc:Choice xmlns:p15="http://schemas.microsoft.com/office/powerpoint/2012/main" xmlns="" Requires="p15">
+    <mc:Choice xmlns="" xmlns:p15="http://schemas.microsoft.com/office/powerpoint/2012/main" Requires="p15">
       <p:transition xmlns:p14="http://schemas.microsoft.com/office/powerpoint/2010/main" spd="slow" p14:dur="2000">
         <p15:prstTrans prst="fracture"/>
       </p:transition>
@@ -5497,9 +5446,6 @@
               </a:rPr>
               <a:t>Model &amp; Data Access Object</a:t>
             </a:r>
-            <a:endParaRPr lang="fr-FR" sz="5500" dirty="0">
-              <a:latin typeface="Helvetica LT Std" panose="020B0504020202020204" pitchFamily="34" charset="0"/>
-            </a:endParaRPr>
           </a:p>
         </p:txBody>
       </p:sp>
@@ -5529,19 +5475,7 @@
               <a:rPr lang="fr-FR" sz="3500" dirty="0" smtClean="0">
                 <a:latin typeface="Helvetica LT Std" panose="020B0504020202020204" pitchFamily="34" charset="0"/>
               </a:rPr>
-              <a:t>Le Model est constitué </a:t>
-            </a:r>
-            <a:r>
-              <a:rPr lang="fr-FR" sz="3500" dirty="0" smtClean="0">
-                <a:latin typeface="Helvetica LT Std" panose="020B0504020202020204" pitchFamily="34" charset="0"/>
-              </a:rPr>
-              <a:t>des classes </a:t>
-            </a:r>
-            <a:r>
-              <a:rPr lang="fr-FR" sz="3500" dirty="0" smtClean="0">
-                <a:latin typeface="Helvetica LT Std" panose="020B0504020202020204" pitchFamily="34" charset="0"/>
-              </a:rPr>
-              <a:t>métiers</a:t>
+              <a:t>Le Model est constitué des classes métiers</a:t>
             </a:r>
           </a:p>
           <a:p>
@@ -5638,7 +5572,7 @@
     <a:masterClrMapping/>
   </p:clrMapOvr>
   <mc:AlternateContent xmlns:mc="http://schemas.openxmlformats.org/markup-compatibility/2006">
-    <mc:Choice xmlns:p15="http://schemas.microsoft.com/office/powerpoint/2012/main" xmlns="" Requires="p15">
+    <mc:Choice xmlns="" xmlns:p15="http://schemas.microsoft.com/office/powerpoint/2012/main" Requires="p15">
       <p:transition xmlns:p14="http://schemas.microsoft.com/office/powerpoint/2010/main" spd="slow" p14:dur="2000">
         <p15:prstTrans prst="fracture"/>
       </p:transition>
@@ -5850,7 +5784,7 @@
     <a:masterClrMapping/>
   </p:clrMapOvr>
   <mc:AlternateContent xmlns:mc="http://schemas.openxmlformats.org/markup-compatibility/2006">
-    <mc:Choice xmlns:p15="http://schemas.microsoft.com/office/powerpoint/2012/main" xmlns="" Requires="p15">
+    <mc:Choice xmlns="" xmlns:p15="http://schemas.microsoft.com/office/powerpoint/2012/main" Requires="p15">
       <p:transition xmlns:p14="http://schemas.microsoft.com/office/powerpoint/2010/main" spd="slow" p14:dur="2000">
         <p15:prstTrans prst="fracture"/>
       </p:transition>
@@ -6032,16 +5966,16 @@
               <a:t>Le fichier de config permet de redéfinir </a:t>
             </a:r>
             <a:r>
-              <a:rPr lang="fr-FR" sz="3500" dirty="0" err="1" smtClean="0">
-                <a:latin typeface="Helvetica LT Std" panose="020B0504020202020204" pitchFamily="34" charset="0"/>
-              </a:rPr>
-              <a:t>rapidemment</a:t>
-            </a:r>
-            <a:r>
               <a:rPr lang="fr-FR" sz="3500" dirty="0" smtClean="0">
                 <a:latin typeface="Helvetica LT Std" panose="020B0504020202020204" pitchFamily="34" charset="0"/>
               </a:rPr>
-              <a:t> la connexion BDD</a:t>
+              <a:t>rapidement </a:t>
+            </a:r>
+            <a:r>
+              <a:rPr lang="fr-FR" sz="3500" dirty="0" smtClean="0">
+                <a:latin typeface="Helvetica LT Std" panose="020B0504020202020204" pitchFamily="34" charset="0"/>
+              </a:rPr>
+              <a:t>la connexion BDD</a:t>
             </a:r>
             <a:endParaRPr lang="fr-FR" sz="3500" dirty="0">
               <a:latin typeface="Helvetica LT Std" panose="020B0504020202020204" pitchFamily="34" charset="0"/>
@@ -6098,7 +6032,7 @@
     <a:masterClrMapping/>
   </p:clrMapOvr>
   <mc:AlternateContent xmlns:mc="http://schemas.openxmlformats.org/markup-compatibility/2006">
-    <mc:Choice xmlns:p15="http://schemas.microsoft.com/office/powerpoint/2012/main" xmlns="" Requires="p15">
+    <mc:Choice xmlns="" xmlns:p15="http://schemas.microsoft.com/office/powerpoint/2012/main" Requires="p15">
       <p:transition xmlns:p14="http://schemas.microsoft.com/office/powerpoint/2010/main" spd="slow" p14:dur="2000">
         <p15:prstTrans prst="fracture"/>
       </p:transition>
@@ -6362,7 +6296,7 @@
     <a:masterClrMapping/>
   </p:clrMapOvr>
   <mc:AlternateContent xmlns:mc="http://schemas.openxmlformats.org/markup-compatibility/2006">
-    <mc:Choice xmlns:p15="http://schemas.microsoft.com/office/powerpoint/2012/main" xmlns="" Requires="p15">
+    <mc:Choice xmlns="" xmlns:p15="http://schemas.microsoft.com/office/powerpoint/2012/main" Requires="p15">
       <p:transition xmlns:p14="http://schemas.microsoft.com/office/powerpoint/2010/main" spd="slow" p14:dur="2000">
         <p15:prstTrans prst="fracture"/>
       </p:transition>

</xml_diff>